<commit_message>
fixed conclusion(added logos/cleaned layout)
</commit_message>
<xml_diff>
--- a/documentation/WatechParkPoster.pptx
+++ b/documentation/WatechParkPoster.pptx
@@ -5216,7 +5216,7 @@
           <a:p>
             <a:pPr marL="381000" indent="-381000"/>
             <a:r>
-              <a:rPr lang="en-US" sz="3200" b="1" dirty="0">
+              <a:rPr lang="en-US" sz="3200" b="1" u="sng" dirty="0">
                 <a:solidFill>
                   <a:schemeClr val="accent1">
                     <a:lumMod val="90000"/>
@@ -5597,7 +5597,7 @@
           <a:p>
             <a:pPr marL="381000" indent="-381000"/>
             <a:r>
-              <a:rPr lang="en-US" sz="3200" b="1" dirty="0">
+              <a:rPr lang="en-US" sz="3200" b="1" u="sng" dirty="0">
                 <a:solidFill>
                   <a:schemeClr val="accent1">
                     <a:lumMod val="90000"/>

</xml_diff>

<commit_message>
pre-final poster update(replaced case/lot screens)
</commit_message>
<xml_diff>
--- a/documentation/WatechParkPoster.pptx
+++ b/documentation/WatechParkPoster.pptx
@@ -5216,7 +5216,7 @@
           <a:p>
             <a:pPr marL="381000" indent="-381000"/>
             <a:r>
-              <a:rPr lang="en-US" sz="3200" b="1" u="sng" dirty="0">
+              <a:rPr lang="en-US" sz="3200" b="1" dirty="0">
                 <a:solidFill>
                   <a:schemeClr val="accent1">
                     <a:lumMod val="90000"/>
@@ -5597,7 +5597,7 @@
           <a:p>
             <a:pPr marL="381000" indent="-381000"/>
             <a:r>
-              <a:rPr lang="en-US" sz="3200" b="1" u="sng" dirty="0">
+              <a:rPr lang="en-US" sz="3200" b="1" dirty="0">
                 <a:solidFill>
                   <a:schemeClr val="accent1">
                     <a:lumMod val="90000"/>
@@ -6516,7 +6516,7 @@
                   </a:schemeClr>
                 </a:solidFill>
               </a:rPr>
-              <a:t>As shown above, between the entrance and exit there is available space for the Raspberry Pi and the sensors attached. The sensors/effectors would go through under the parking lot and connect back to the space allotted. The IR Break-Beam sensors are connected to the entry and exit. The VCNL4010 proximity sensor is located at Slot 1A, which would be connected through a wall and attached facing the parking spot to detect the presence of a car approaching the spot. The camera would have been attached to a bar over the entry to scan the license plate on top of the car. The enclosure was designed using the CorelDraw software. The enclosure would clip onto the SMART parking lot model and hold the PCB in place with the Raspberry Pi platform.</a:t>
+              <a:t>As shown above, between the entrance and exit there is available space for the Raspberry Pi and the sensors attached. The sensors/effectors would go through under the parking lot and connect back to the space allotted. The IR Break-Beam sensors are connected to the entry and exit. The VCNL4010 proximity sensor is located at Slot 1A, which would be connected through a wall and attached facing the parking spot to detect the presence of a car approaching the spot. The camera would have been attached to a bar over the entry to scan the license plate on top of the car. The enclosure was designed using the Inkscape software. The enclosure would clip onto the SMART parking lot model and hold the PCB in place with the Raspberry Pi platform.</a:t>
             </a:r>
             <a:endParaRPr lang="en-US" sz="2000" b="1" dirty="0">
               <a:solidFill>
@@ -8040,72 +8040,6 @@
           </a:p>
         </p:txBody>
       </p:sp>
-      <p:pic>
-        <p:nvPicPr>
-          <p:cNvPr id="11" name="Graphic 10">
-            <a:extLst>
-              <a:ext uri="{FF2B5EF4-FFF2-40B4-BE49-F238E27FC236}">
-                <a16:creationId xmlns:a16="http://schemas.microsoft.com/office/drawing/2014/main" id="{F4B4AD18-3A0C-4035-B2AB-E0A754155FD0}"/>
-              </a:ext>
-            </a:extLst>
-          </p:cNvPr>
-          <p:cNvPicPr>
-            <a:picLocks noChangeAspect="1"/>
-          </p:cNvPicPr>
-          <p:nvPr/>
-        </p:nvPicPr>
-        <p:blipFill>
-          <a:blip r:embed="rId19">
-            <a:extLst>
-              <a:ext uri="{96DAC541-7B7A-43D3-8B79-37D633B846F1}">
-                <asvg:svgBlip xmlns:asvg="http://schemas.microsoft.com/office/drawing/2016/SVG/main" r:embed="rId20"/>
-              </a:ext>
-            </a:extLst>
-          </a:blip>
-          <a:stretch>
-            <a:fillRect/>
-          </a:stretch>
-        </p:blipFill>
-        <p:spPr>
-          <a:xfrm>
-            <a:off x="38191990" y="13717017"/>
-            <a:ext cx="3932321" cy="3560711"/>
-          </a:xfrm>
-          <a:prstGeom prst="rect">
-            <a:avLst/>
-          </a:prstGeom>
-        </p:spPr>
-      </p:pic>
-      <p:pic>
-        <p:nvPicPr>
-          <p:cNvPr id="12" name="Picture 11">
-            <a:extLst>
-              <a:ext uri="{FF2B5EF4-FFF2-40B4-BE49-F238E27FC236}">
-                <a16:creationId xmlns:a16="http://schemas.microsoft.com/office/drawing/2014/main" id="{1D7B0A30-3CC7-4275-AEB3-F938121FC9DC}"/>
-              </a:ext>
-            </a:extLst>
-          </p:cNvPr>
-          <p:cNvPicPr>
-            <a:picLocks noChangeAspect="1"/>
-          </p:cNvPicPr>
-          <p:nvPr/>
-        </p:nvPicPr>
-        <p:blipFill>
-          <a:blip r:embed="rId21"/>
-          <a:stretch>
-            <a:fillRect/>
-          </a:stretch>
-        </p:blipFill>
-        <p:spPr>
-          <a:xfrm rot="16200000">
-            <a:off x="39016415" y="6985801"/>
-            <a:ext cx="2503144" cy="5357606"/>
-          </a:xfrm>
-          <a:prstGeom prst="rect">
-            <a:avLst/>
-          </a:prstGeom>
-        </p:spPr>
-      </p:pic>
       <p:sp>
         <p:nvSpPr>
           <p:cNvPr id="54" name="TextBox 53">
@@ -8139,7 +8073,7 @@
                 <a:latin typeface="Times New Roman" panose="02020603050405020304" pitchFamily="18" charset="0"/>
                 <a:cs typeface="Times New Roman" panose="02020603050405020304" pitchFamily="18" charset="0"/>
               </a:rPr>
-              <a:t>Final Enclosure Design(CorelDraw)</a:t>
+              <a:t>Final Enclosure Design(Inkscape)</a:t>
             </a:r>
           </a:p>
         </p:txBody>
@@ -8195,7 +8129,7 @@
           <p:nvPr/>
         </p:nvPicPr>
         <p:blipFill>
-          <a:blip r:embed="rId22">
+          <a:blip r:embed="rId19">
             <a:extLst>
               <a:ext uri="{28A0092B-C50C-407E-A947-70E740481C1C}">
                 <a14:useLocalDpi xmlns:a14="http://schemas.microsoft.com/office/drawing/2010/main" val="0"/>
@@ -8231,7 +8165,7 @@
           <p:nvPr/>
         </p:nvPicPr>
         <p:blipFill>
-          <a:blip r:embed="rId23"/>
+          <a:blip r:embed="rId20"/>
           <a:stretch>
             <a:fillRect/>
           </a:stretch>
@@ -8244,6 +8178,77 @@
           <a:prstGeom prst="rect">
             <a:avLst/>
           </a:prstGeom>
+        </p:spPr>
+      </p:pic>
+      <p:pic>
+        <p:nvPicPr>
+          <p:cNvPr id="24" name="Picture 23">
+            <a:extLst>
+              <a:ext uri="{FF2B5EF4-FFF2-40B4-BE49-F238E27FC236}">
+                <a16:creationId xmlns:a16="http://schemas.microsoft.com/office/drawing/2014/main" id="{E8FAB6C4-4AA9-4CD1-AF24-AFF6A73B8460}"/>
+              </a:ext>
+            </a:extLst>
+          </p:cNvPr>
+          <p:cNvPicPr>
+            <a:picLocks noChangeAspect="1"/>
+          </p:cNvPicPr>
+          <p:nvPr/>
+        </p:nvPicPr>
+        <p:blipFill>
+          <a:blip r:embed="rId21"/>
+          <a:stretch>
+            <a:fillRect/>
+          </a:stretch>
+        </p:blipFill>
+        <p:spPr>
+          <a:xfrm rot="16200000">
+            <a:off x="38762805" y="7017442"/>
+            <a:ext cx="2492525" cy="5478271"/>
+          </a:xfrm>
+          <a:prstGeom prst="rect">
+            <a:avLst/>
+          </a:prstGeom>
+        </p:spPr>
+      </p:pic>
+      <p:pic>
+        <p:nvPicPr>
+          <p:cNvPr id="25" name="Picture 24">
+            <a:extLst>
+              <a:ext uri="{FF2B5EF4-FFF2-40B4-BE49-F238E27FC236}">
+                <a16:creationId xmlns:a16="http://schemas.microsoft.com/office/drawing/2014/main" id="{0B42C4C7-D204-40EA-8628-565C60409556}"/>
+              </a:ext>
+            </a:extLst>
+          </p:cNvPr>
+          <p:cNvPicPr>
+            <a:picLocks noChangeAspect="1"/>
+          </p:cNvPicPr>
+          <p:nvPr/>
+        </p:nvPicPr>
+        <p:blipFill>
+          <a:blip r:embed="rId22"/>
+          <a:stretch>
+            <a:fillRect/>
+          </a:stretch>
+        </p:blipFill>
+        <p:spPr>
+          <a:xfrm>
+            <a:off x="37786112" y="13696383"/>
+            <a:ext cx="5201293" cy="3627067"/>
+          </a:xfrm>
+          <a:prstGeom prst="rect">
+            <a:avLst/>
+          </a:prstGeom>
+          <a:pattFill prst="pct70">
+            <a:fgClr>
+              <a:srgbClr val="FF0000"/>
+            </a:fgClr>
+            <a:bgClr>
+              <a:schemeClr val="bg1"/>
+            </a:bgClr>
+          </a:pattFill>
+          <a:ln>
+            <a:noFill/>
+          </a:ln>
         </p:spPr>
       </p:pic>
     </p:spTree>

</xml_diff>

<commit_message>
(fixed aim,conclusion,added 3D printed part)
</commit_message>
<xml_diff>
--- a/documentation/WatechParkPoster.pptx
+++ b/documentation/WatechParkPoster.pptx
@@ -3865,14 +3865,14 @@
           </a:ln>
           <a:extLst>
             <a:ext uri="{909E8E84-426E-40dd-AFC4-6F175D3DCCD1}">
-              <a14:hiddenFill xmlns="" xmlns:a14="http://schemas.microsoft.com/office/drawing/2010/main">
+              <a14:hiddenFill xmlns:a14="http://schemas.microsoft.com/office/drawing/2010/main" xmlns="">
                 <a:solidFill>
                   <a:srgbClr val="FFFFFF"/>
                 </a:solidFill>
               </a14:hiddenFill>
             </a:ext>
             <a:ext uri="{91240B29-F687-4f45-9708-019B960494DF}">
-              <a14:hiddenLine xmlns="" xmlns:a14="http://schemas.microsoft.com/office/drawing/2010/main" w="9525">
+              <a14:hiddenLine xmlns:a14="http://schemas.microsoft.com/office/drawing/2010/main" xmlns="" w="9525">
                 <a:solidFill>
                   <a:srgbClr val="000000"/>
                 </a:solidFill>
@@ -3926,7 +3926,7 @@
                 <a:latin typeface="Georgia" charset="0"/>
                 <a:cs typeface="Georgia" charset="0"/>
               </a:rPr>
-              <a:t>Department of Applied Technology, Computer Engineering Technology, Humber College</a:t>
+              <a:t>Department of Applied Technology, Computer Engineering Technology, Humber College Institute Of Technology &amp; Advanced Learning</a:t>
             </a:r>
           </a:p>
         </p:txBody>
@@ -3953,14 +3953,14 @@
           </a:ln>
           <a:extLst>
             <a:ext uri="{909E8E84-426E-40dd-AFC4-6F175D3DCCD1}">
-              <a14:hiddenFill xmlns="" xmlns:a14="http://schemas.microsoft.com/office/drawing/2010/main">
+              <a14:hiddenFill xmlns:a14="http://schemas.microsoft.com/office/drawing/2010/main" xmlns="">
                 <a:solidFill>
                   <a:srgbClr val="FFFFFF"/>
                 </a:solidFill>
               </a14:hiddenFill>
             </a:ext>
             <a:ext uri="{91240B29-F687-4f45-9708-019B960494DF}">
-              <a14:hiddenLine xmlns="" xmlns:a14="http://schemas.microsoft.com/office/drawing/2010/main" w="9525">
+              <a14:hiddenLine xmlns:a14="http://schemas.microsoft.com/office/drawing/2010/main" xmlns="" w="9525">
                 <a:solidFill>
                   <a:srgbClr val="000000"/>
                 </a:solidFill>
@@ -4116,8 +4116,8 @@
         </p:nvSpPr>
         <p:spPr bwMode="auto">
           <a:xfrm>
-            <a:off x="32918400" y="25628432"/>
-            <a:ext cx="10561469" cy="4266378"/>
+            <a:off x="32904111" y="25875208"/>
+            <a:ext cx="10561469" cy="4508700"/>
           </a:xfrm>
           <a:prstGeom prst="rect">
             <a:avLst/>
@@ -4130,7 +4130,7 @@
           </a:ln>
           <a:extLst>
             <a:ext uri="{91240B29-F687-4f45-9708-019B960494DF}">
-              <a14:hiddenLine xmlns="" xmlns:a14="http://schemas.microsoft.com/office/drawing/2010/main" w="9525">
+              <a14:hiddenLine xmlns:a14="http://schemas.microsoft.com/office/drawing/2010/main" xmlns="" w="9525">
                 <a:solidFill>
                   <a:srgbClr val="000000"/>
                 </a:solidFill>
@@ -4269,6 +4269,23 @@
             <a:endParaRPr lang="en-US" sz="2000" b="1" dirty="0"/>
           </a:p>
           <a:p>
+            <a:r>
+              <a:rPr lang="en-US" sz="2000" b="1" dirty="0" err="1"/>
+              <a:t>Thingiverse</a:t>
+            </a:r>
+            <a:r>
+              <a:rPr lang="en-US" sz="2000" b="1" dirty="0"/>
+              <a:t>. (2019). SG90 Servo Horn Extender. Retrieved from </a:t>
+            </a:r>
+            <a:r>
+              <a:rPr lang="en-US" sz="2000" b="1" dirty="0">
+                <a:hlinkClick r:id="rId6"/>
+              </a:rPr>
+              <a:t>https://www.thingiverse.com/thing:3814678</a:t>
+            </a:r>
+            <a:endParaRPr lang="en-US" sz="2000" b="1" dirty="0"/>
+          </a:p>
+          <a:p>
             <a:endParaRPr lang="en-US" sz="2000" dirty="0"/>
           </a:p>
           <a:p>
@@ -4306,8 +4323,8 @@
         </p:nvSpPr>
         <p:spPr bwMode="auto">
           <a:xfrm>
-            <a:off x="381000" y="20955000"/>
-            <a:ext cx="10591800" cy="11201400"/>
+            <a:off x="381000" y="18288000"/>
+            <a:ext cx="10591800" cy="13868400"/>
           </a:xfrm>
           <a:prstGeom prst="rect">
             <a:avLst/>
@@ -4320,7 +4337,7 @@
           </a:ln>
           <a:extLst>
             <a:ext uri="{91240B29-F687-4f45-9708-019B960494DF}">
-              <a14:hiddenLine xmlns="" xmlns:a14="http://schemas.microsoft.com/office/drawing/2010/main" w="9525">
+              <a14:hiddenLine xmlns:a14="http://schemas.microsoft.com/office/drawing/2010/main" xmlns="" w="9525">
                 <a:solidFill>
                   <a:srgbClr val="000000"/>
                 </a:solidFill>
@@ -4354,6 +4371,17 @@
                 </a:effectLst>
               </a:rPr>
               <a:t>AIM</a:t>
+            </a:r>
+          </a:p>
+          <a:p>
+            <a:pPr>
+              <a:spcBef>
+                <a:spcPct val="50000"/>
+              </a:spcBef>
+            </a:pPr>
+            <a:r>
+              <a:rPr lang="en-US" sz="2000" b="1" dirty="0"/>
+              <a:t>The main objective of this undertaking is to provide a more efficient and reliable platform to aid with parking scenarios. In particular, for the purpose of the consumer demographic who’s in the market for an alternative parking lot management system. Our focus was to develop a platform, that would be the gateway to support consumers with finding the best parking space during any time, any place or anywhere in the world.</a:t>
             </a:r>
           </a:p>
           <a:p>
@@ -4387,6 +4415,28 @@
                 <a:spcPct val="50000"/>
               </a:spcBef>
             </a:pPr>
+            <a:endParaRPr lang="en-US" sz="3200" b="1" u="sng" dirty="0">
+              <a:solidFill>
+                <a:schemeClr val="accent1">
+                  <a:lumMod val="90000"/>
+                  <a:lumOff val="10000"/>
+                </a:schemeClr>
+              </a:solidFill>
+              <a:effectLst>
+                <a:outerShdw blurRad="38100" dist="38100" dir="2700000" algn="tl">
+                  <a:srgbClr val="000000">
+                    <a:alpha val="43137"/>
+                  </a:srgbClr>
+                </a:outerShdw>
+              </a:effectLst>
+            </a:endParaRPr>
+          </a:p>
+          <a:p>
+            <a:pPr>
+              <a:spcBef>
+                <a:spcPct val="50000"/>
+              </a:spcBef>
+            </a:pPr>
             <a:endParaRPr lang="en-US" sz="2800" b="1" dirty="0">
               <a:solidFill>
                 <a:schemeClr val="accent1">
@@ -4427,7 +4477,7 @@
                 <a:spcPct val="50000"/>
               </a:spcBef>
             </a:pPr>
-            <a:endParaRPr lang="en-US" sz="3200" b="1" dirty="0">
+            <a:endParaRPr lang="en-US" sz="3200" b="1" u="sng" dirty="0">
               <a:solidFill>
                 <a:schemeClr val="accent1">
                   <a:lumMod val="90000"/>
@@ -4449,7 +4499,7 @@
                 <a:spcPct val="50000"/>
               </a:spcBef>
             </a:pPr>
-            <a:endParaRPr lang="en-US" sz="3200" b="1" dirty="0">
+            <a:endParaRPr lang="en-US" sz="3200" b="1" u="sng" dirty="0">
               <a:solidFill>
                 <a:schemeClr val="accent1">
                   <a:lumMod val="90000"/>
@@ -4468,29 +4518,7 @@
           <a:p>
             <a:pPr>
               <a:spcBef>
-                <a:spcPct val="50000"/>
-              </a:spcBef>
-            </a:pPr>
-            <a:endParaRPr lang="en-US" sz="3200" b="1" dirty="0">
-              <a:solidFill>
-                <a:schemeClr val="accent1">
-                  <a:lumMod val="90000"/>
-                  <a:lumOff val="10000"/>
-                </a:schemeClr>
-              </a:solidFill>
-              <a:effectLst>
-                <a:outerShdw blurRad="38100" dist="38100" dir="2700000" algn="tl">
-                  <a:srgbClr val="000000">
-                    <a:alpha val="43137"/>
-                  </a:srgbClr>
-                </a:outerShdw>
-              </a:effectLst>
-            </a:endParaRPr>
-          </a:p>
-          <a:p>
-            <a:pPr>
-              <a:spcBef>
-                <a:spcPct val="50000"/>
+                <a:spcPts val="0"/>
               </a:spcBef>
             </a:pPr>
             <a:r>
@@ -4511,20 +4539,11 @@
               </a:rPr>
               <a:t>Required Resources/Tools:</a:t>
             </a:r>
-            <a:endParaRPr lang="en-US" sz="2400" b="1" u="sng" dirty="0">
-              <a:effectLst>
-                <a:outerShdw blurRad="38100" dist="38100" dir="2700000" algn="tl">
-                  <a:srgbClr val="000000">
-                    <a:alpha val="43137"/>
-                  </a:srgbClr>
-                </a:outerShdw>
-              </a:effectLst>
-            </a:endParaRPr>
           </a:p>
           <a:p>
             <a:pPr>
               <a:spcBef>
-                <a:spcPct val="50000"/>
+                <a:spcPts val="0"/>
               </a:spcBef>
             </a:pPr>
             <a:r>
@@ -4544,19 +4563,13 @@
             </a:r>
           </a:p>
           <a:p>
-            <a:pPr>
+            <a:pPr marL="342900" indent="-342900">
               <a:spcBef>
                 <a:spcPts val="0"/>
               </a:spcBef>
-            </a:pPr>
-            <a:r>
-              <a:rPr lang="en-US" sz="2200" dirty="0"/>
-              <a:t>-</a:t>
-            </a:r>
-            <a:r>
-              <a:rPr lang="en-US" sz="2200" b="1" dirty="0"/>
-              <a:t> </a:t>
-            </a:r>
+              <a:buFont typeface="Wingdings" panose="05000000000000000000" pitchFamily="2" charset="2"/>
+              <a:buChar char="v"/>
+            </a:pPr>
             <a:r>
               <a:rPr lang="en-US" sz="2200" b="1" dirty="0">
                 <a:effectLst>
@@ -4575,36 +4588,78 @@
             </a:r>
           </a:p>
           <a:p>
-            <a:pPr>
+            <a:pPr marL="342900" indent="-342900">
               <a:spcBef>
                 <a:spcPts val="0"/>
               </a:spcBef>
-            </a:pPr>
+              <a:buFont typeface="Wingdings" panose="05000000000000000000" pitchFamily="2" charset="2"/>
+              <a:buChar char="v"/>
+            </a:pPr>
+            <a:r>
+              <a:rPr lang="en-US" sz="2200" b="1" dirty="0">
+                <a:effectLst>
+                  <a:outerShdw blurRad="38100" dist="38100" dir="2700000" algn="tl">
+                    <a:srgbClr val="000000">
+                      <a:alpha val="43137"/>
+                    </a:srgbClr>
+                  </a:outerShdw>
+                </a:effectLst>
+              </a:rPr>
+              <a:t> </a:t>
+            </a:r>
             <a:r>
               <a:rPr lang="en-US" sz="2000" b="1" dirty="0"/>
-              <a:t>-   IR Break-Beam Sensor</a:t>
-            </a:r>
-          </a:p>
-          <a:p>
-            <a:pPr>
+              <a:t>IR Break-Beam Sensor</a:t>
+            </a:r>
+          </a:p>
+          <a:p>
+            <a:pPr marL="342900" indent="-342900">
               <a:spcBef>
                 <a:spcPts val="0"/>
               </a:spcBef>
-            </a:pPr>
+              <a:buFont typeface="Wingdings" panose="05000000000000000000" pitchFamily="2" charset="2"/>
+              <a:buChar char="v"/>
+            </a:pPr>
+            <a:r>
+              <a:rPr lang="en-US" sz="2200" b="1" dirty="0">
+                <a:effectLst>
+                  <a:outerShdw blurRad="38100" dist="38100" dir="2700000" algn="tl">
+                    <a:srgbClr val="000000">
+                      <a:alpha val="43137"/>
+                    </a:srgbClr>
+                  </a:outerShdw>
+                </a:effectLst>
+              </a:rPr>
+              <a:t> </a:t>
+            </a:r>
             <a:r>
               <a:rPr lang="en-US" sz="2000" b="1" dirty="0"/>
-              <a:t>-   PCA9685 Servo Controller</a:t>
-            </a:r>
-          </a:p>
-          <a:p>
-            <a:pPr>
+              <a:t>PCA9685 Servo Controller</a:t>
+            </a:r>
+          </a:p>
+          <a:p>
+            <a:pPr marL="342900" indent="-342900">
               <a:spcBef>
                 <a:spcPts val="0"/>
               </a:spcBef>
-            </a:pPr>
+              <a:buFont typeface="Wingdings" panose="05000000000000000000" pitchFamily="2" charset="2"/>
+              <a:buChar char="v"/>
+            </a:pPr>
+            <a:r>
+              <a:rPr lang="en-US" sz="2200" b="1" dirty="0">
+                <a:effectLst>
+                  <a:outerShdw blurRad="38100" dist="38100" dir="2700000" algn="tl">
+                    <a:srgbClr val="000000">
+                      <a:alpha val="43137"/>
+                    </a:srgbClr>
+                  </a:outerShdw>
+                </a:effectLst>
+              </a:rPr>
+              <a:t> </a:t>
+            </a:r>
             <a:r>
               <a:rPr lang="en-US" sz="2000" b="1" dirty="0"/>
-              <a:t>-   2 Micro Servo Motors(entry/exit gate control)</a:t>
+              <a:t>2 Micro-Servo Motors(entry/exit gate control)</a:t>
             </a:r>
           </a:p>
           <a:p>
@@ -4630,16 +4685,48 @@
             </a:r>
           </a:p>
           <a:p>
+            <a:pPr>
+              <a:spcBef>
+                <a:spcPts val="0"/>
+              </a:spcBef>
+            </a:pPr>
+            <a:r>
+              <a:rPr lang="en-US" sz="2000" b="1" dirty="0"/>
+              <a:t>The hardware/software tools utilized include the following: </a:t>
+            </a:r>
+          </a:p>
+          <a:p>
             <a:pPr marL="342900" indent="-342900">
               <a:spcBef>
                 <a:spcPts val="0"/>
               </a:spcBef>
-              <a:buFontTx/>
-              <a:buChar char="-"/>
+              <a:buFont typeface="Wingdings" panose="05000000000000000000" pitchFamily="2" charset="2"/>
+              <a:buChar char="Ø"/>
             </a:pPr>
             <a:r>
               <a:rPr lang="en-US" sz="2000" b="1" dirty="0"/>
-              <a:t>Wire cutters, soldering iron, solder material, helping hand, pin headers</a:t>
+              <a:t>Wire cutters, soldering iron, solder material, helping hand, pin headers, breadboard(PCB testing purposes), parts tool kit</a:t>
+            </a:r>
+          </a:p>
+          <a:p>
+            <a:pPr marL="342900" indent="-342900">
+              <a:spcBef>
+                <a:spcPts val="0"/>
+              </a:spcBef>
+              <a:buFont typeface="Wingdings" panose="05000000000000000000" pitchFamily="2" charset="2"/>
+              <a:buChar char="Ø"/>
+            </a:pPr>
+            <a:r>
+              <a:rPr lang="en-US" sz="2000" b="1" dirty="0">
+                <a:solidFill>
+                  <a:srgbClr val="C00000"/>
+                </a:solidFill>
+              </a:rPr>
+              <a:t>Development Tools: </a:t>
+            </a:r>
+            <a:r>
+              <a:rPr lang="en-US" sz="2000" b="1" dirty="0"/>
+              <a:t>Android Studio, Fritzing , CorelDraw X7, Inkscape</a:t>
             </a:r>
           </a:p>
           <a:p>
@@ -4672,15 +4759,7 @@
             </a:pPr>
             <a:r>
               <a:rPr lang="en-US" sz="2000" b="1" dirty="0"/>
-              <a:t>The prototype lab in Humber College is the main source of providing the services to etch the PCB board during its final stages of production as well as provide laser-cutting services initially planned. The electronics lab facility also allowed our team to work on the project, for both hardware/software purposes. Adjustments were made to the project through active involvement by our industrial collaborator from </a:t>
-            </a:r>
-            <a:r>
-              <a:rPr lang="en-US" sz="2000" b="1" dirty="0" err="1"/>
-              <a:t>ParkingBoxx</a:t>
-            </a:r>
-            <a:r>
-              <a:rPr lang="en-US" sz="2000" b="1" dirty="0"/>
-              <a:t>, Mike Wrona. </a:t>
+              <a:t>The prototype lab in Humber College is the main source of providing the services to etch the PCB board during its final stages of production as well as provide laser-cutting services initially planned. The electronics lab facility also allowed our team to work on the project, for both hardware/software purposes. Adjustments were made to the project through active involvement by our industrial collaborator from Parking, Mike Wrona. </a:t>
             </a:r>
           </a:p>
           <a:p>
@@ -4712,7 +4791,7 @@
                 </a:solidFill>
                 <a:latin typeface="Arial" panose="020B0604020202020204" pitchFamily="34" charset="0"/>
                 <a:cs typeface="Arial" panose="020B0604020202020204" pitchFamily="34" charset="0"/>
-                <a:hlinkClick r:id="rId6">
+                <a:hlinkClick r:id="rId7">
                   <a:extLst>
                     <a:ext uri="{A12FA001-AC4F-418D-AE19-62706E023703}">
                       <ahyp:hlinkClr xmlns:ahyp="http://schemas.microsoft.com/office/drawing/2018/hyperlinkcolor" val="tx"/>
@@ -4834,7 +4913,7 @@
         <p:spPr bwMode="auto">
           <a:xfrm>
             <a:off x="397042" y="5029200"/>
-            <a:ext cx="10591800" cy="15468600"/>
+            <a:ext cx="10591800" cy="12851732"/>
           </a:xfrm>
           <a:prstGeom prst="rect">
             <a:avLst/>
@@ -4847,7 +4926,7 @@
           </a:ln>
           <a:extLst>
             <a:ext uri="{91240B29-F687-4f45-9708-019B960494DF}">
-              <a14:hiddenLine xmlns="" xmlns:a14="http://schemas.microsoft.com/office/drawing/2010/main" w="9525">
+              <a14:hiddenLine xmlns:a14="http://schemas.microsoft.com/office/drawing/2010/main" xmlns="" w="9525">
                 <a:solidFill>
                   <a:srgbClr val="000000"/>
                 </a:solidFill>
@@ -4884,18 +4963,23 @@
             </a:r>
           </a:p>
           <a:p>
-            <a:r>
-              <a:rPr lang="en-US" sz="2000" b="1" dirty="0"/>
-              <a:t> </a:t>
-            </a:r>
-            <a:endParaRPr lang="en-US" sz="3200" b="1" dirty="0"/>
-          </a:p>
-          <a:p>
-            <a:pPr>
-              <a:spcBef>
-                <a:spcPts val="0"/>
-              </a:spcBef>
-            </a:pPr>
+            <a:endParaRPr lang="en-US" sz="3200" b="1" u="sng" dirty="0">
+              <a:solidFill>
+                <a:schemeClr val="accent1">
+                  <a:lumMod val="90000"/>
+                  <a:lumOff val="10000"/>
+                </a:schemeClr>
+              </a:solidFill>
+              <a:effectLst>
+                <a:outerShdw blurRad="38100" dist="38100" dir="2700000" algn="tl">
+                  <a:srgbClr val="000000">
+                    <a:alpha val="43137"/>
+                  </a:srgbClr>
+                </a:outerShdw>
+              </a:effectLst>
+            </a:endParaRPr>
+          </a:p>
+          <a:p>
             <a:r>
               <a:rPr lang="en-US" sz="3200" b="1" u="sng" dirty="0">
                 <a:solidFill>
@@ -4921,7 +5005,7 @@
                 <a:spcPts val="0"/>
               </a:spcBef>
             </a:pPr>
-            <a:endParaRPr lang="en-US" sz="2000" dirty="0"/>
+            <a:endParaRPr lang="en-US" sz="2000" b="1" dirty="0"/>
           </a:p>
           <a:p>
             <a:pPr>
@@ -4933,28 +5017,24 @@
               <a:rPr lang="en-US" sz="2000" b="1" dirty="0"/>
               <a:t>Many busy parking lots are often plagued with congestion, with drivers competing to find a spot by cruising around and locating the right parking space. This is inefficient, time consuming where productivity is lost for consumers and businesses. The system we will be developing will address payment for parking, capacity management and location finding following an IoT approach using hardware and software. This project is focused on solving these issues by connecting consumers to parking lot owners and providing parking services by using a more convenient, simpler method to retrieve parking lot data seamlessly.</a:t>
             </a:r>
-          </a:p>
-          <a:p>
-            <a:pPr>
-              <a:spcBef>
-                <a:spcPts val="0"/>
-              </a:spcBef>
-            </a:pPr>
-            <a:endParaRPr lang="en-US" sz="2000" b="1" dirty="0"/>
-          </a:p>
-          <a:p>
-            <a:pPr>
-              <a:spcBef>
-                <a:spcPts val="0"/>
-              </a:spcBef>
-            </a:pPr>
-            <a:r>
-              <a:rPr lang="en-US" sz="2000" b="1" dirty="0"/>
-              <a:t>The main objective of this undertaking is to provide a more efficient and reliable platform to aid with parking scenarios. In particular, for the purpose of the consumer demographic who’s in the market for an alternative parking lot management system. Our focus was to develop a platform, that would be the gateway to support consumers with finding the best parking space during any time, any place or anywhere in the world.</a:t>
-            </a:r>
-          </a:p>
-          <a:p>
             <a:endParaRPr lang="en-US" sz="3200" b="1" dirty="0">
+              <a:solidFill>
+                <a:schemeClr val="accent1">
+                  <a:lumMod val="90000"/>
+                  <a:lumOff val="10000"/>
+                </a:schemeClr>
+              </a:solidFill>
+              <a:effectLst>
+                <a:outerShdw blurRad="38100" dist="38100" dir="2700000" algn="tl">
+                  <a:srgbClr val="000000">
+                    <a:alpha val="43137"/>
+                  </a:srgbClr>
+                </a:outerShdw>
+              </a:effectLst>
+            </a:endParaRPr>
+          </a:p>
+          <a:p>
+            <a:endParaRPr lang="en-US" sz="3200" b="1" u="sng" dirty="0">
               <a:solidFill>
                 <a:schemeClr val="accent1">
                   <a:lumMod val="90000"/>
@@ -4991,21 +5071,7 @@
             </a:r>
           </a:p>
           <a:p>
-            <a:endParaRPr lang="en-US" sz="3200" b="1" u="sng" dirty="0">
-              <a:solidFill>
-                <a:schemeClr val="accent1">
-                  <a:lumMod val="90000"/>
-                  <a:lumOff val="10000"/>
-                </a:schemeClr>
-              </a:solidFill>
-              <a:effectLst>
-                <a:outerShdw blurRad="38100" dist="38100" dir="2700000" algn="tl">
-                  <a:srgbClr val="000000">
-                    <a:alpha val="43137"/>
-                  </a:srgbClr>
-                </a:outerShdw>
-              </a:effectLst>
-            </a:endParaRPr>
+            <a:endParaRPr lang="en-US" sz="2000" b="1" dirty="0"/>
           </a:p>
           <a:p>
             <a:r>
@@ -5060,7 +5126,7 @@
             </a:r>
           </a:p>
           <a:p>
-            <a:endParaRPr lang="en-US" sz="3200" b="1" u="sng" dirty="0">
+            <a:endParaRPr lang="en-US" sz="2000" b="1" u="sng" dirty="0">
               <a:solidFill>
                 <a:schemeClr val="accent1">
                   <a:lumMod val="90000"/>
@@ -5147,7 +5213,7 @@
           </a:ln>
           <a:extLst>
             <a:ext uri="{91240B29-F687-4f45-9708-019B960494DF}">
-              <a14:hiddenLine xmlns="" xmlns:a14="http://schemas.microsoft.com/office/drawing/2010/main" w="9525">
+              <a14:hiddenLine xmlns:a14="http://schemas.microsoft.com/office/drawing/2010/main" xmlns="" w="9525">
                 <a:solidFill>
                   <a:srgbClr val="000000"/>
                 </a:solidFill>
@@ -5216,7 +5282,7 @@
           <a:p>
             <a:pPr marL="381000" indent="-381000"/>
             <a:r>
-              <a:rPr lang="en-US" sz="3200" b="1" dirty="0">
+              <a:rPr lang="en-US" sz="3200" b="1" u="sng" dirty="0">
                 <a:solidFill>
                   <a:schemeClr val="accent1">
                     <a:lumMod val="90000"/>
@@ -5597,7 +5663,7 @@
           <a:p>
             <a:pPr marL="381000" indent="-381000"/>
             <a:r>
-              <a:rPr lang="en-US" sz="3200" b="1" dirty="0">
+              <a:rPr lang="en-US" sz="3200" b="1" u="sng" dirty="0">
                 <a:solidFill>
                   <a:schemeClr val="accent1">
                     <a:lumMod val="90000"/>
@@ -5677,7 +5743,7 @@
           </a:ln>
           <a:extLst>
             <a:ext uri="{91240B29-F687-4f45-9708-019B960494DF}">
-              <a14:hiddenLine xmlns="" xmlns:a14="http://schemas.microsoft.com/office/drawing/2010/main" w="9525">
+              <a14:hiddenLine xmlns:a14="http://schemas.microsoft.com/office/drawing/2010/main" xmlns="" w="9525">
                 <a:solidFill>
                   <a:srgbClr val="000000"/>
                 </a:solidFill>
@@ -6346,7 +6412,7 @@
           </a:ln>
           <a:extLst>
             <a:ext uri="{91240B29-F687-4f45-9708-019B960494DF}">
-              <a14:hiddenLine xmlns="" xmlns:a14="http://schemas.microsoft.com/office/drawing/2010/main" w="9525">
+              <a14:hiddenLine xmlns:a14="http://schemas.microsoft.com/office/drawing/2010/main" xmlns="" w="9525">
                 <a:solidFill>
                   <a:srgbClr val="000000"/>
                 </a:solidFill>
@@ -6516,8 +6582,10 @@
                   </a:schemeClr>
                 </a:solidFill>
               </a:rPr>
-              <a:t>As shown above, between the entrance and exit there is available space for the Raspberry Pi and the sensors attached. The sensors/effectors would go through under the parking lot and connect back to the space allotted. The IR Break-Beam sensors are connected to the entry and exit. The VCNL4010 proximity sensor is located at Slot 1A, which would be connected through a wall and attached facing the parking spot to detect the presence of a car approaching the spot. The camera would have been attached to a bar over the entry to scan the license plate on top of the car. The enclosure was designed using the Inkscape software. The enclosure would clip onto the SMART parking lot model and hold the PCB in place with the Raspberry Pi platform.</a:t>
-            </a:r>
+              <a:t>As shown above, between the entrance and exit there is available space for the Raspberry Pi and the sensors attached. The sensors/effectors would go through under the parking lot and connect back to the space allotted. The IR Break-Beam sensors are connected to the entry and exit. The VCNL4010 proximity sensor is located at Slot 1A, which would be connected through a wall and attached facing the parking spot to detect the presence of a car approaching the spot. The camera would have been attached to a bar over the entry to scan the license plate on top of the car. The 3D printed barrier would have been attached to the sides of the servo motors horns, designed using the Inkscape software along with the case as shown below. The enclosure would clip onto the SMART parking lot model and hold the PCB in place with the Raspberry Pi platform.</a:t>
+            </a:r>
+          </a:p>
+          <a:p>
             <a:endParaRPr lang="en-US" sz="2000" b="1" dirty="0">
               <a:solidFill>
                 <a:schemeClr val="accent1">
@@ -6546,8 +6614,8 @@
         </p:nvSpPr>
         <p:spPr bwMode="auto">
           <a:xfrm>
-            <a:off x="32904111" y="17880932"/>
-            <a:ext cx="10575757" cy="7341267"/>
+            <a:off x="32904111" y="17652897"/>
+            <a:ext cx="10575757" cy="8053330"/>
           </a:xfrm>
           <a:prstGeom prst="rect">
             <a:avLst/>
@@ -6560,7 +6628,7 @@
           </a:ln>
           <a:extLst>
             <a:ext uri="{91240B29-F687-4f45-9708-019B960494DF}">
-              <a14:hiddenLine xmlns="" xmlns:a14="http://schemas.microsoft.com/office/drawing/2010/main" w="9525">
+              <a14:hiddenLine xmlns:a14="http://schemas.microsoft.com/office/drawing/2010/main" xmlns="" w="9525">
                 <a:solidFill>
                   <a:srgbClr val="000000"/>
                 </a:solidFill>
@@ -6663,7 +6731,7 @@
             </a:r>
             <a:r>
               <a:rPr lang="en-US" sz="2000" b="1" dirty="0"/>
-              <a:t> IoT capstone project was developed to address the consumer demographic by determining a alternative method in regards to payment for parking, capacity management, and real-time information gathering. During the course of fifteen weeks, we have worked extensively on designing, developing, and integrating hardware/software components in preparation of unit testing, mass production testing phases, and, overall refinement. Therefore, through the combined effort of all team members, we have successfully achieved our proposed objective by creating an alternative parking lot management system, to assist with everyday consumer occurrences and parking situations.</a:t>
+              <a:t> IoT capstone project was developed to address the consumer demographic by determining a alternative method in regards to payment for parking, capacity management, and real-time information gathering. During the course of fifteen weeks, we have worked extensively on designing, developing, and integrating hardware/software components in preparation of unit testing, mass production testing phases, and overall refinement. Therefore, through the combined effort of all team members, we have successfully achieved our proposed objective by creating an alternative parking lot management system, to assist with everyday consumer occurrences and parking situations.</a:t>
             </a:r>
           </a:p>
           <a:p>
@@ -6686,10 +6754,8 @@
                   </a:schemeClr>
                 </a:solidFill>
               </a:rPr>
-              <a:t>Future steps may include, a more compact PCB design to accompany the use of the two servo motors. Thus, reducing the overall footprint size of the project by a more considerable amount and allowing further room for improvement in terms of hardware use/capabilities. Other possible additions, may include adding  support for each available parking spot on our prototype model. This would require the use of a I2C multiplexer to allow individual VCNL4010 proximity sensors to be positioned at each parking space, rather than the current single VCNL4010 device. Additionally, support for the Android mobile application can include future modifications to allow room for a full ‘admin’ login mode as initially planned, providing the admin user the ability to view advanced metrics/ live data.</a:t>
-            </a:r>
-          </a:p>
-          <a:p>
+              <a:t>Future steps may include, a more compact PCB design to accompany the use of the two servo motors. Thus, reducing the overall footprint size of the project by a more considerable amount and allowing further room for improvement in terms of hardware use/capabilities. Other possible additions, may include adding  support for each available parking spot on our prototype model. This would require the use of a I2C multiplexer to allow individual VCNL4010 proximity sensors to be positioned at each parking space, rather than the current single VCNL4010 device. Additionally, to appeal to the mass market a web application may be developed to allow a wide range of public users the ability to view advanced metrics/live parking lot data. The application would mirror the mobile application and allow the consumer to interact through a global reach. Thus, in return gaining further popularity to contend as a major alternative SMART parking IoT platform from a investors standpoint.</a:t>
+            </a:r>
             <a:endParaRPr lang="en-US" sz="2800" b="1" dirty="0">
               <a:solidFill>
                 <a:schemeClr val="accent1">
@@ -6723,14 +6789,14 @@
           <p:nvPr/>
         </p:nvPicPr>
         <p:blipFill>
-          <a:blip r:embed="rId7"/>
+          <a:blip r:embed="rId8"/>
           <a:stretch>
             <a:fillRect/>
           </a:stretch>
         </p:blipFill>
         <p:spPr>
           <a:xfrm>
-            <a:off x="2027895" y="22707536"/>
+            <a:off x="1849931" y="22005630"/>
             <a:ext cx="7296116" cy="3200527"/>
           </a:xfrm>
           <a:prstGeom prst="rect">
@@ -6752,7 +6818,7 @@
         </p:nvSpPr>
         <p:spPr>
           <a:xfrm>
-            <a:off x="3761896" y="26134430"/>
+            <a:off x="3677230" y="25273684"/>
             <a:ext cx="4281633" cy="461665"/>
           </a:xfrm>
           <a:prstGeom prst="rect">
@@ -6789,7 +6855,7 @@
           <p:nvPr/>
         </p:nvPicPr>
         <p:blipFill>
-          <a:blip r:embed="rId8" cstate="print">
+          <a:blip r:embed="rId9" cstate="print">
             <a:extLst>
               <a:ext uri="{28A0092B-C50C-407E-A947-70E740481C1C}">
                 <a14:useLocalDpi xmlns:a14="http://schemas.microsoft.com/office/drawing/2010/main" val="0"/>
@@ -6816,45 +6882,6 @@
             <a:extLst>
               <a:ext uri="{FF2B5EF4-FFF2-40B4-BE49-F238E27FC236}">
                 <a16:creationId xmlns:a16="http://schemas.microsoft.com/office/drawing/2014/main" id="{BF51F1FC-D0D4-4B9F-8C2C-0D9A6B633119}"/>
-              </a:ext>
-            </a:extLst>
-          </p:cNvPr>
-          <p:cNvPicPr/>
-          <p:nvPr/>
-        </p:nvPicPr>
-        <p:blipFill>
-          <a:blip r:embed="rId9" cstate="print">
-            <a:extLst>
-              <a:ext uri="{28A0092B-C50C-407E-A947-70E740481C1C}">
-                <a14:useLocalDpi xmlns:a14="http://schemas.microsoft.com/office/drawing/2010/main" val="0"/>
-              </a:ext>
-            </a:extLst>
-          </a:blip>
-          <a:srcRect/>
-          <a:stretch>
-            <a:fillRect/>
-          </a:stretch>
-        </p:blipFill>
-        <p:spPr bwMode="auto">
-          <a:xfrm>
-            <a:off x="26036490" y="11937089"/>
-            <a:ext cx="2297678" cy="3985794"/>
-          </a:xfrm>
-          <a:prstGeom prst="rect">
-            <a:avLst/>
-          </a:prstGeom>
-          <a:noFill/>
-          <a:ln>
-            <a:noFill/>
-          </a:ln>
-        </p:spPr>
-      </p:pic>
-      <p:pic>
-        <p:nvPicPr>
-          <p:cNvPr id="33" name="Picture 32">
-            <a:extLst>
-              <a:ext uri="{FF2B5EF4-FFF2-40B4-BE49-F238E27FC236}">
-                <a16:creationId xmlns:a16="http://schemas.microsoft.com/office/drawing/2014/main" id="{2459FD58-97A3-4014-A3C7-4BA6A0EDBF01}"/>
               </a:ext>
             </a:extLst>
           </p:cNvPr>
@@ -6876,6 +6903,45 @@
         </p:blipFill>
         <p:spPr bwMode="auto">
           <a:xfrm>
+            <a:off x="26036490" y="11937089"/>
+            <a:ext cx="2297678" cy="3985794"/>
+          </a:xfrm>
+          <a:prstGeom prst="rect">
+            <a:avLst/>
+          </a:prstGeom>
+          <a:noFill/>
+          <a:ln>
+            <a:noFill/>
+          </a:ln>
+        </p:spPr>
+      </p:pic>
+      <p:pic>
+        <p:nvPicPr>
+          <p:cNvPr id="33" name="Picture 32">
+            <a:extLst>
+              <a:ext uri="{FF2B5EF4-FFF2-40B4-BE49-F238E27FC236}">
+                <a16:creationId xmlns:a16="http://schemas.microsoft.com/office/drawing/2014/main" id="{2459FD58-97A3-4014-A3C7-4BA6A0EDBF01}"/>
+              </a:ext>
+            </a:extLst>
+          </p:cNvPr>
+          <p:cNvPicPr/>
+          <p:nvPr/>
+        </p:nvPicPr>
+        <p:blipFill>
+          <a:blip r:embed="rId11" cstate="print">
+            <a:extLst>
+              <a:ext uri="{28A0092B-C50C-407E-A947-70E740481C1C}">
+                <a14:useLocalDpi xmlns:a14="http://schemas.microsoft.com/office/drawing/2010/main" val="0"/>
+              </a:ext>
+            </a:extLst>
+          </a:blip>
+          <a:srcRect/>
+          <a:stretch>
+            <a:fillRect/>
+          </a:stretch>
+        </p:blipFill>
+        <p:spPr bwMode="auto">
+          <a:xfrm>
             <a:off x="29327336" y="11937089"/>
             <a:ext cx="2364206" cy="4034066"/>
           </a:xfrm>
@@ -7142,7 +7208,7 @@
           <p:nvPr/>
         </p:nvPicPr>
         <p:blipFill>
-          <a:blip r:embed="rId11"/>
+          <a:blip r:embed="rId12"/>
           <a:stretch>
             <a:fillRect/>
           </a:stretch>
@@ -7170,7 +7236,7 @@
           <p:nvPr/>
         </p:nvPicPr>
         <p:blipFill>
-          <a:blip r:embed="rId12"/>
+          <a:blip r:embed="rId13"/>
           <a:stretch>
             <a:fillRect/>
           </a:stretch>
@@ -7198,7 +7264,7 @@
           <p:nvPr/>
         </p:nvPicPr>
         <p:blipFill>
-          <a:blip r:embed="rId13"/>
+          <a:blip r:embed="rId14"/>
           <a:stretch>
             <a:fillRect/>
           </a:stretch>
@@ -7226,7 +7292,7 @@
           <p:nvPr/>
         </p:nvPicPr>
         <p:blipFill>
-          <a:blip r:embed="rId14"/>
+          <a:blip r:embed="rId15"/>
           <a:stretch>
             <a:fillRect/>
           </a:stretch>
@@ -7254,7 +7320,7 @@
           <p:nvPr/>
         </p:nvPicPr>
         <p:blipFill>
-          <a:blip r:embed="rId15"/>
+          <a:blip r:embed="rId16"/>
           <a:stretch>
             <a:fillRect/>
           </a:stretch>
@@ -7282,7 +7348,7 @@
           <p:nvPr/>
         </p:nvPicPr>
         <p:blipFill>
-          <a:blip r:embed="rId16"/>
+          <a:blip r:embed="rId17"/>
           <a:stretch>
             <a:fillRect/>
           </a:stretch>
@@ -7310,7 +7376,7 @@
           <p:nvPr/>
         </p:nvPicPr>
         <p:blipFill>
-          <a:blip r:embed="rId17"/>
+          <a:blip r:embed="rId18"/>
           <a:stretch>
             <a:fillRect/>
           </a:stretch>
@@ -7338,7 +7404,7 @@
           <p:nvPr/>
         </p:nvPicPr>
         <p:blipFill>
-          <a:blip r:embed="rId18"/>
+          <a:blip r:embed="rId19"/>
           <a:stretch>
             <a:fillRect/>
           </a:stretch>
@@ -7762,7 +7828,7 @@
         </p:nvSpPr>
         <p:spPr>
           <a:xfrm flipH="1">
-            <a:off x="5514010" y="22191412"/>
+            <a:off x="5497989" y="21586653"/>
             <a:ext cx="3810001" cy="430887"/>
           </a:xfrm>
           <a:prstGeom prst="rect">
@@ -8054,8 +8120,8 @@
         </p:nvSpPr>
         <p:spPr>
           <a:xfrm>
-            <a:off x="33739380" y="15061118"/>
-            <a:ext cx="3225752" cy="769441"/>
+            <a:off x="39060792" y="16829424"/>
+            <a:ext cx="4419076" cy="430887"/>
           </a:xfrm>
           <a:prstGeom prst="rect">
             <a:avLst/>
@@ -8129,7 +8195,7 @@
           <p:nvPr/>
         </p:nvPicPr>
         <p:blipFill>
-          <a:blip r:embed="rId19">
+          <a:blip r:embed="rId20">
             <a:extLst>
               <a:ext uri="{28A0092B-C50C-407E-A947-70E740481C1C}">
                 <a14:useLocalDpi xmlns:a14="http://schemas.microsoft.com/office/drawing/2010/main" val="0"/>
@@ -8165,14 +8231,14 @@
           <p:nvPr/>
         </p:nvPicPr>
         <p:blipFill>
-          <a:blip r:embed="rId20"/>
+          <a:blip r:embed="rId21"/>
           <a:stretch>
             <a:fillRect/>
           </a:stretch>
         </p:blipFill>
         <p:spPr>
           <a:xfrm>
-            <a:off x="34612059" y="30383908"/>
+            <a:off x="34630032" y="30663813"/>
             <a:ext cx="7188439" cy="1772492"/>
           </a:xfrm>
           <a:prstGeom prst="rect">
@@ -8195,7 +8261,7 @@
           <p:nvPr/>
         </p:nvPicPr>
         <p:blipFill>
-          <a:blip r:embed="rId21"/>
+          <a:blip r:embed="rId22"/>
           <a:stretch>
             <a:fillRect/>
           </a:stretch>
@@ -8225,15 +8291,15 @@
           <p:nvPr/>
         </p:nvPicPr>
         <p:blipFill>
-          <a:blip r:embed="rId22"/>
+          <a:blip r:embed="rId23"/>
           <a:stretch>
             <a:fillRect/>
           </a:stretch>
         </p:blipFill>
         <p:spPr>
           <a:xfrm>
-            <a:off x="37786112" y="13696383"/>
-            <a:ext cx="5201293" cy="3627067"/>
+            <a:off x="38970949" y="14059917"/>
+            <a:ext cx="3984461" cy="2778522"/>
           </a:xfrm>
           <a:prstGeom prst="rect">
             <a:avLst/>
@@ -8251,6 +8317,74 @@
           </a:ln>
         </p:spPr>
       </p:pic>
+      <p:pic>
+        <p:nvPicPr>
+          <p:cNvPr id="10" name="Picture 9">
+            <a:extLst>
+              <a:ext uri="{FF2B5EF4-FFF2-40B4-BE49-F238E27FC236}">
+                <a16:creationId xmlns:a16="http://schemas.microsoft.com/office/drawing/2014/main" id="{464EC7DD-6620-4887-A79A-64665D2119D1}"/>
+              </a:ext>
+            </a:extLst>
+          </p:cNvPr>
+          <p:cNvPicPr>
+            <a:picLocks noChangeAspect="1"/>
+          </p:cNvPicPr>
+          <p:nvPr/>
+        </p:nvPicPr>
+        <p:blipFill>
+          <a:blip r:embed="rId24"/>
+          <a:stretch>
+            <a:fillRect/>
+          </a:stretch>
+        </p:blipFill>
+        <p:spPr>
+          <a:xfrm>
+            <a:off x="34616069" y="14289831"/>
+            <a:ext cx="2807525" cy="2372778"/>
+          </a:xfrm>
+          <a:prstGeom prst="rect">
+            <a:avLst/>
+          </a:prstGeom>
+        </p:spPr>
+      </p:pic>
+      <p:sp>
+        <p:nvSpPr>
+          <p:cNvPr id="57" name="TextBox 56">
+            <a:extLst>
+              <a:ext uri="{FF2B5EF4-FFF2-40B4-BE49-F238E27FC236}">
+                <a16:creationId xmlns:a16="http://schemas.microsoft.com/office/drawing/2014/main" id="{8F0A5594-27BC-400D-BBBB-CD85D2C1A4B8}"/>
+              </a:ext>
+            </a:extLst>
+          </p:cNvPr>
+          <p:cNvSpPr txBox="1"/>
+          <p:nvPr/>
+        </p:nvSpPr>
+        <p:spPr>
+          <a:xfrm>
+            <a:off x="33985200" y="16816630"/>
+            <a:ext cx="5300727" cy="430887"/>
+          </a:xfrm>
+          <a:prstGeom prst="rect">
+            <a:avLst/>
+          </a:prstGeom>
+          <a:noFill/>
+        </p:spPr>
+        <p:txBody>
+          <a:bodyPr wrap="square" rtlCol="0">
+            <a:spAutoFit/>
+          </a:bodyPr>
+          <a:lstStyle/>
+          <a:p>
+            <a:r>
+              <a:rPr lang="en-US" sz="2200" b="1" i="1" dirty="0">
+                <a:latin typeface="Times New Roman" panose="02020603050405020304" pitchFamily="18" charset="0"/>
+                <a:cs typeface="Times New Roman" panose="02020603050405020304" pitchFamily="18" charset="0"/>
+              </a:rPr>
+              <a:t>3D Printed Micro-Servo Motor Horns</a:t>
+            </a:r>
+          </a:p>
+        </p:txBody>
+      </p:sp>
     </p:spTree>
   </p:cSld>
   <p:clrMapOvr>

</xml_diff>

<commit_message>
pre-final poster update(fixed enclosure section)
</commit_message>
<xml_diff>
--- a/documentation/WatechParkPoster.pptx
+++ b/documentation/WatechParkPoster.pptx
@@ -5187,7 +5187,7 @@
         </p:nvSpPr>
         <p:spPr bwMode="auto">
           <a:xfrm>
-            <a:off x="11720513" y="5181600"/>
+            <a:off x="11720513" y="5257800"/>
             <a:ext cx="9829800" cy="26974800"/>
           </a:xfrm>
           <a:prstGeom prst="rect">
@@ -8349,8 +8349,8 @@
         </p:nvSpPr>
         <p:spPr>
           <a:xfrm>
-            <a:off x="33985200" y="16816630"/>
-            <a:ext cx="5300727" cy="430887"/>
+            <a:off x="33093315" y="16833919"/>
+            <a:ext cx="5986527" cy="430887"/>
           </a:xfrm>
           <a:prstGeom prst="rect">
             <a:avLst/>
@@ -8368,7 +8368,7 @@
                 <a:latin typeface="Times New Roman" panose="02020603050405020304" pitchFamily="18" charset="0"/>
                 <a:cs typeface="Times New Roman" panose="02020603050405020304" pitchFamily="18" charset="0"/>
               </a:rPr>
-              <a:t>3D Printed Micro-Servo Motor Barrier</a:t>
+              <a:t>3D Printed SG90 Servo Horn Extender(barrier)</a:t>
             </a:r>
           </a:p>
         </p:txBody>

</xml_diff>